<commit_message>
change projects and docs
</commit_message>
<xml_diff>
--- a/документы/Презентация защита Ефремова.pptx
+++ b/документы/Презентация защита Ефремова.pptx
@@ -18,11 +18,13 @@
     <p:sldId id="278" r:id="rId12"/>
     <p:sldId id="279" r:id="rId13"/>
     <p:sldId id="280" r:id="rId14"/>
-    <p:sldId id="281" r:id="rId15"/>
-    <p:sldId id="267" r:id="rId16"/>
-    <p:sldId id="273" r:id="rId17"/>
-    <p:sldId id="269" r:id="rId18"/>
-    <p:sldId id="270" r:id="rId19"/>
+    <p:sldId id="283" r:id="rId15"/>
+    <p:sldId id="281" r:id="rId16"/>
+    <p:sldId id="282" r:id="rId17"/>
+    <p:sldId id="267" r:id="rId18"/>
+    <p:sldId id="273" r:id="rId19"/>
+    <p:sldId id="269" r:id="rId20"/>
+    <p:sldId id="270" r:id="rId21"/>
   </p:sldIdLst>
   <p:sldSz cx="12192000" cy="6858000"/>
   <p:notesSz cx="6858000" cy="9144000"/>
@@ -288,7 +290,7 @@
           <a:p>
             <a:fld id="{D7B6A5F9-199B-4DA3-AAED-3B13DA2663CF}" type="datetimeFigureOut">
               <a:rPr lang="ru-RU" smtClean="0"/>
-              <a:t>12.12.2023</a:t>
+              <a:t>13.12.2023</a:t>
             </a:fld>
             <a:endParaRPr lang="ru-RU"/>
           </a:p>
@@ -486,7 +488,7 @@
           <a:p>
             <a:fld id="{D7B6A5F9-199B-4DA3-AAED-3B13DA2663CF}" type="datetimeFigureOut">
               <a:rPr lang="ru-RU" smtClean="0"/>
-              <a:t>12.12.2023</a:t>
+              <a:t>13.12.2023</a:t>
             </a:fld>
             <a:endParaRPr lang="ru-RU"/>
           </a:p>
@@ -694,7 +696,7 @@
           <a:p>
             <a:fld id="{D7B6A5F9-199B-4DA3-AAED-3B13DA2663CF}" type="datetimeFigureOut">
               <a:rPr lang="ru-RU" smtClean="0"/>
-              <a:t>12.12.2023</a:t>
+              <a:t>13.12.2023</a:t>
             </a:fld>
             <a:endParaRPr lang="ru-RU"/>
           </a:p>
@@ -892,7 +894,7 @@
           <a:p>
             <a:fld id="{D7B6A5F9-199B-4DA3-AAED-3B13DA2663CF}" type="datetimeFigureOut">
               <a:rPr lang="ru-RU" smtClean="0"/>
-              <a:t>12.12.2023</a:t>
+              <a:t>13.12.2023</a:t>
             </a:fld>
             <a:endParaRPr lang="ru-RU"/>
           </a:p>
@@ -1167,7 +1169,7 @@
           <a:p>
             <a:fld id="{D7B6A5F9-199B-4DA3-AAED-3B13DA2663CF}" type="datetimeFigureOut">
               <a:rPr lang="ru-RU" smtClean="0"/>
-              <a:t>12.12.2023</a:t>
+              <a:t>13.12.2023</a:t>
             </a:fld>
             <a:endParaRPr lang="ru-RU"/>
           </a:p>
@@ -1432,7 +1434,7 @@
           <a:p>
             <a:fld id="{D7B6A5F9-199B-4DA3-AAED-3B13DA2663CF}" type="datetimeFigureOut">
               <a:rPr lang="ru-RU" smtClean="0"/>
-              <a:t>12.12.2023</a:t>
+              <a:t>13.12.2023</a:t>
             </a:fld>
             <a:endParaRPr lang="ru-RU"/>
           </a:p>
@@ -1844,7 +1846,7 @@
           <a:p>
             <a:fld id="{D7B6A5F9-199B-4DA3-AAED-3B13DA2663CF}" type="datetimeFigureOut">
               <a:rPr lang="ru-RU" smtClean="0"/>
-              <a:t>12.12.2023</a:t>
+              <a:t>13.12.2023</a:t>
             </a:fld>
             <a:endParaRPr lang="ru-RU"/>
           </a:p>
@@ -1985,7 +1987,7 @@
           <a:p>
             <a:fld id="{D7B6A5F9-199B-4DA3-AAED-3B13DA2663CF}" type="datetimeFigureOut">
               <a:rPr lang="ru-RU" smtClean="0"/>
-              <a:t>12.12.2023</a:t>
+              <a:t>13.12.2023</a:t>
             </a:fld>
             <a:endParaRPr lang="ru-RU"/>
           </a:p>
@@ -2098,7 +2100,7 @@
           <a:p>
             <a:fld id="{D7B6A5F9-199B-4DA3-AAED-3B13DA2663CF}" type="datetimeFigureOut">
               <a:rPr lang="ru-RU" smtClean="0"/>
-              <a:t>12.12.2023</a:t>
+              <a:t>13.12.2023</a:t>
             </a:fld>
             <a:endParaRPr lang="ru-RU"/>
           </a:p>
@@ -2409,7 +2411,7 @@
           <a:p>
             <a:fld id="{D7B6A5F9-199B-4DA3-AAED-3B13DA2663CF}" type="datetimeFigureOut">
               <a:rPr lang="ru-RU" smtClean="0"/>
-              <a:t>12.12.2023</a:t>
+              <a:t>13.12.2023</a:t>
             </a:fld>
             <a:endParaRPr lang="ru-RU"/>
           </a:p>
@@ -2697,7 +2699,7 @@
           <a:p>
             <a:fld id="{D7B6A5F9-199B-4DA3-AAED-3B13DA2663CF}" type="datetimeFigureOut">
               <a:rPr lang="ru-RU" smtClean="0"/>
-              <a:t>12.12.2023</a:t>
+              <a:t>13.12.2023</a:t>
             </a:fld>
             <a:endParaRPr lang="ru-RU"/>
           </a:p>
@@ -2938,7 +2940,7 @@
           <a:p>
             <a:fld id="{D7B6A5F9-199B-4DA3-AAED-3B13DA2663CF}" type="datetimeFigureOut">
               <a:rPr lang="ru-RU" smtClean="0"/>
-              <a:t>12.12.2023</a:t>
+              <a:t>13.12.2023</a:t>
             </a:fld>
             <a:endParaRPr lang="ru-RU"/>
           </a:p>
@@ -4966,7 +4968,7 @@
         </p:spPr>
         <p:txBody>
           <a:bodyPr>
-            <a:normAutofit fontScale="92500" lnSpcReduction="10000"/>
+            <a:normAutofit fontScale="92500"/>
           </a:bodyPr>
           <a:lstStyle/>
           <a:p>
@@ -4979,10 +4981,23 @@
                 <a:ea typeface="Calibri" panose="020F0502020204030204" pitchFamily="34" charset="0"/>
                 <a:cs typeface="Calibri" panose="020F0502020204030204" pitchFamily="34" charset="0"/>
               </a:rPr>
-              <a:t>В современных информационных системах все чаще возникает необходимость в защите данных от несанкционированного доступа. Одним из способов защиты данных является шифрование. Шифрование - это процесс преобразования данных в нечитаемый вид с помощью ключа. Для расшифровки данных необходим тот же ключ, который использовался для шифрования.</a:t>
-            </a:r>
-          </a:p>
-          <a:p>
+              <a:t>В современных информационных системах все чаще возникает необходимость в защите данных от несанкционированного доступа. Одним из способов защиты данных является шифрование. Шифрование - это процесс преобразования данных в нечитаемый вид с помощью ключа. </a:t>
+            </a:r>
+            <a:br>
+              <a:rPr lang="ru-RU" sz="2500" dirty="0">
+                <a:effectLst/>
+                <a:ea typeface="Calibri" panose="020F0502020204030204" pitchFamily="34" charset="0"/>
+                <a:cs typeface="Calibri" panose="020F0502020204030204" pitchFamily="34" charset="0"/>
+              </a:rPr>
+            </a:br>
+            <a:r>
+              <a:rPr lang="ru-RU" sz="2500" dirty="0">
+                <a:effectLst/>
+                <a:ea typeface="Calibri" panose="020F0502020204030204" pitchFamily="34" charset="0"/>
+                <a:cs typeface="Calibri" panose="020F0502020204030204" pitchFamily="34" charset="0"/>
+              </a:rPr>
+              <a:t>Один из методов шифрования – хеширование.</a:t>
+            </a:r>
             <a:endParaRPr lang="ru-RU" dirty="0"/>
           </a:p>
         </p:txBody>
@@ -5025,10 +5040,10 @@
       </p:pic>
       <p:pic>
         <p:nvPicPr>
-          <p:cNvPr id="6" name="Рисунок 5">
-            <a:extLst>
-              <a:ext uri="{FF2B5EF4-FFF2-40B4-BE49-F238E27FC236}">
-                <a16:creationId xmlns:a16="http://schemas.microsoft.com/office/drawing/2014/main" id="{F4E7378A-A64E-4677-953E-780F78262607}"/>
+          <p:cNvPr id="9" name="Рисунок 8">
+            <a:extLst>
+              <a:ext uri="{FF2B5EF4-FFF2-40B4-BE49-F238E27FC236}">
+                <a16:creationId xmlns:a16="http://schemas.microsoft.com/office/drawing/2014/main" id="{F06B44DF-76B4-4BEA-AE80-FBD733D5C2E8}"/>
               </a:ext>
             </a:extLst>
           </p:cNvPr>
@@ -5051,8 +5066,8 @@
         </p:blipFill>
         <p:spPr>
           <a:xfrm>
-            <a:off x="575698" y="4171643"/>
-            <a:ext cx="11040603" cy="1814184"/>
+            <a:off x="648872" y="4151239"/>
+            <a:ext cx="10894255" cy="1760934"/>
           </a:xfrm>
           <a:prstGeom prst="rect">
             <a:avLst/>
@@ -5097,7 +5112,7 @@
           <p:cNvPr id="2" name="Заголовок 1">
             <a:extLst>
               <a:ext uri="{FF2B5EF4-FFF2-40B4-BE49-F238E27FC236}">
-                <a16:creationId xmlns:a16="http://schemas.microsoft.com/office/drawing/2014/main" id="{26F0FF5F-7985-4856-8A6B-6B243478A07E}"/>
+                <a16:creationId xmlns:a16="http://schemas.microsoft.com/office/drawing/2014/main" id="{63D1F956-5D17-4DCD-92DA-A030AB640F4E}"/>
               </a:ext>
             </a:extLst>
           </p:cNvPr>
@@ -5130,10 +5145,10 @@
       </p:sp>
       <p:pic>
         <p:nvPicPr>
-          <p:cNvPr id="5" name="Объект 4">
-            <a:extLst>
-              <a:ext uri="{FF2B5EF4-FFF2-40B4-BE49-F238E27FC236}">
-                <a16:creationId xmlns:a16="http://schemas.microsoft.com/office/drawing/2014/main" id="{CB647056-037C-45BB-87F8-B76406F4D312}"/>
+          <p:cNvPr id="4" name="Объект 8">
+            <a:extLst>
+              <a:ext uri="{FF2B5EF4-FFF2-40B4-BE49-F238E27FC236}">
+                <a16:creationId xmlns:a16="http://schemas.microsoft.com/office/drawing/2014/main" id="{D104AFB8-9305-47FD-8267-61B4CB6419B7}"/>
               </a:ext>
             </a:extLst>
           </p:cNvPr>
@@ -5158,17 +5173,17 @@
         </p:blipFill>
         <p:spPr>
           <a:xfrm>
-            <a:off x="6489896" y="2016125"/>
-            <a:ext cx="5010150" cy="4086225"/>
+            <a:off x="1052475" y="1883801"/>
+            <a:ext cx="9056370" cy="4409871"/>
           </a:xfrm>
         </p:spPr>
       </p:pic>
       <p:pic>
         <p:nvPicPr>
-          <p:cNvPr id="7" name="Рисунок 6">
-            <a:extLst>
-              <a:ext uri="{FF2B5EF4-FFF2-40B4-BE49-F238E27FC236}">
-                <a16:creationId xmlns:a16="http://schemas.microsoft.com/office/drawing/2014/main" id="{9241DF22-CDE5-4E2E-9A1D-3BBEA3D245A1}"/>
+          <p:cNvPr id="5" name="Объект 4">
+            <a:extLst>
+              <a:ext uri="{FF2B5EF4-FFF2-40B4-BE49-F238E27FC236}">
+                <a16:creationId xmlns:a16="http://schemas.microsoft.com/office/drawing/2014/main" id="{1D39A0F7-49FC-4459-91DD-05C8B90A03D3}"/>
               </a:ext>
             </a:extLst>
           </p:cNvPr>
@@ -5191,8 +5206,113 @@
         </p:blipFill>
         <p:spPr>
           <a:xfrm>
-            <a:off x="411480" y="1820862"/>
-            <a:ext cx="5867400" cy="4476750"/>
+            <a:off x="10323120" y="253218"/>
+            <a:ext cx="1690688" cy="1690688"/>
+          </a:xfrm>
+          <a:prstGeom prst="rect">
+            <a:avLst/>
+          </a:prstGeom>
+        </p:spPr>
+      </p:pic>
+    </p:spTree>
+    <p:extLst>
+      <p:ext uri="{BB962C8B-B14F-4D97-AF65-F5344CB8AC3E}">
+        <p14:creationId xmlns:p14="http://schemas.microsoft.com/office/powerpoint/2010/main" val="3764022956"/>
+      </p:ext>
+    </p:extLst>
+  </p:cSld>
+  <p:clrMapOvr>
+    <a:masterClrMapping/>
+  </p:clrMapOvr>
+  <p:transition spd="slow">
+    <p:push dir="u"/>
+  </p:transition>
+</p:sld>
+</file>
+
+<file path=ppt/slides/slide15.xml><?xml version="1.0" encoding="utf-8"?>
+<p:sld xmlns:a="http://schemas.openxmlformats.org/drawingml/2006/main" xmlns:r="http://schemas.openxmlformats.org/officeDocument/2006/relationships" xmlns:p="http://schemas.openxmlformats.org/presentationml/2006/main">
+  <p:cSld>
+    <p:spTree>
+      <p:nvGrpSpPr>
+        <p:cNvPr id="1" name=""/>
+        <p:cNvGrpSpPr/>
+        <p:nvPr/>
+      </p:nvGrpSpPr>
+      <p:grpSpPr>
+        <a:xfrm>
+          <a:off x="0" y="0"/>
+          <a:ext cx="0" cy="0"/>
+          <a:chOff x="0" y="0"/>
+          <a:chExt cx="0" cy="0"/>
+        </a:xfrm>
+      </p:grpSpPr>
+      <p:sp>
+        <p:nvSpPr>
+          <p:cNvPr id="2" name="Заголовок 1">
+            <a:extLst>
+              <a:ext uri="{FF2B5EF4-FFF2-40B4-BE49-F238E27FC236}">
+                <a16:creationId xmlns:a16="http://schemas.microsoft.com/office/drawing/2014/main" id="{26F0FF5F-7985-4856-8A6B-6B243478A07E}"/>
+              </a:ext>
+            </a:extLst>
+          </p:cNvPr>
+          <p:cNvSpPr>
+            <a:spLocks noGrp="1"/>
+          </p:cNvSpPr>
+          <p:nvPr>
+            <p:ph type="title"/>
+          </p:nvPr>
+        </p:nvSpPr>
+        <p:spPr/>
+        <p:txBody>
+          <a:bodyPr/>
+          <a:lstStyle/>
+          <a:p>
+            <a:r>
+              <a:rPr lang="ru-RU" sz="4400" cap="all" dirty="0"/>
+              <a:t>Сохранение и ШИФРОВАНИЕ </a:t>
+            </a:r>
+            <a:br>
+              <a:rPr lang="ru-RU" sz="4400" cap="all" dirty="0"/>
+            </a:br>
+            <a:r>
+              <a:rPr lang="ru-RU" sz="4400" cap="all" dirty="0"/>
+              <a:t>базы данных</a:t>
+            </a:r>
+            <a:endParaRPr lang="ru-RU" dirty="0"/>
+          </a:p>
+        </p:txBody>
+      </p:sp>
+      <p:pic>
+        <p:nvPicPr>
+          <p:cNvPr id="11" name="Рисунок 10">
+            <a:extLst>
+              <a:ext uri="{FF2B5EF4-FFF2-40B4-BE49-F238E27FC236}">
+                <a16:creationId xmlns:a16="http://schemas.microsoft.com/office/drawing/2014/main" id="{B3B5D598-06FB-4C2F-80E0-850F20AB1F59}"/>
+              </a:ext>
+            </a:extLst>
+          </p:cNvPr>
+          <p:cNvPicPr>
+            <a:picLocks noChangeAspect="1"/>
+          </p:cNvPicPr>
+          <p:nvPr/>
+        </p:nvPicPr>
+        <p:blipFill>
+          <a:blip r:embed="rId2">
+            <a:extLst>
+              <a:ext uri="{28A0092B-C50C-407E-A947-70E740481C1C}">
+                <a14:useLocalDpi xmlns:a14="http://schemas.microsoft.com/office/drawing/2010/main" val="0"/>
+              </a:ext>
+            </a:extLst>
+          </a:blip>
+          <a:stretch>
+            <a:fillRect/>
+          </a:stretch>
+        </p:blipFill>
+        <p:spPr>
+          <a:xfrm>
+            <a:off x="1078699" y="1690688"/>
+            <a:ext cx="9083640" cy="4984750"/>
           </a:xfrm>
           <a:prstGeom prst="rect">
             <a:avLst/>
@@ -5201,10 +5321,10 @@
       </p:pic>
       <p:pic>
         <p:nvPicPr>
-          <p:cNvPr id="6" name="Объект 4">
-            <a:extLst>
-              <a:ext uri="{FF2B5EF4-FFF2-40B4-BE49-F238E27FC236}">
-                <a16:creationId xmlns:a16="http://schemas.microsoft.com/office/drawing/2014/main" id="{9EAC9D97-5F1D-4A2F-BBF4-1686C6D24043}"/>
+          <p:cNvPr id="16" name="Объект 4">
+            <a:extLst>
+              <a:ext uri="{FF2B5EF4-FFF2-40B4-BE49-F238E27FC236}">
+                <a16:creationId xmlns:a16="http://schemas.microsoft.com/office/drawing/2014/main" id="{DB9ACF79-757F-4E11-9A8F-8E98B83D56CE}"/>
               </a:ext>
             </a:extLst>
           </p:cNvPr>
@@ -5214,7 +5334,7 @@
           <p:nvPr/>
         </p:nvPicPr>
         <p:blipFill>
-          <a:blip r:embed="rId4">
+          <a:blip r:embed="rId3">
             <a:extLst>
               <a:ext uri="{28A0092B-C50C-407E-A947-70E740481C1C}">
                 <a14:useLocalDpi xmlns:a14="http://schemas.microsoft.com/office/drawing/2010/main" val="0"/>
@@ -5227,7 +5347,7 @@
         </p:blipFill>
         <p:spPr>
           <a:xfrm>
-            <a:off x="10402838" y="182562"/>
+            <a:off x="10323120" y="253218"/>
             <a:ext cx="1690688" cy="1690688"/>
           </a:xfrm>
           <a:prstGeom prst="rect">
@@ -5251,7 +5371,150 @@
 </p:sld>
 </file>
 
-<file path=ppt/slides/slide15.xml><?xml version="1.0" encoding="utf-8"?>
+<file path=ppt/slides/slide16.xml><?xml version="1.0" encoding="utf-8"?>
+<p:sld xmlns:a="http://schemas.openxmlformats.org/drawingml/2006/main" xmlns:r="http://schemas.openxmlformats.org/officeDocument/2006/relationships" xmlns:p="http://schemas.openxmlformats.org/presentationml/2006/main">
+  <p:cSld>
+    <p:spTree>
+      <p:nvGrpSpPr>
+        <p:cNvPr id="1" name=""/>
+        <p:cNvGrpSpPr/>
+        <p:nvPr/>
+      </p:nvGrpSpPr>
+      <p:grpSpPr>
+        <a:xfrm>
+          <a:off x="0" y="0"/>
+          <a:ext cx="0" cy="0"/>
+          <a:chOff x="0" y="0"/>
+          <a:chExt cx="0" cy="0"/>
+        </a:xfrm>
+      </p:grpSpPr>
+      <p:sp>
+        <p:nvSpPr>
+          <p:cNvPr id="2" name="Заголовок 1">
+            <a:extLst>
+              <a:ext uri="{FF2B5EF4-FFF2-40B4-BE49-F238E27FC236}">
+                <a16:creationId xmlns:a16="http://schemas.microsoft.com/office/drawing/2014/main" id="{A01E45EE-4AF2-4CEA-9E6A-3146E3354CA5}"/>
+              </a:ext>
+            </a:extLst>
+          </p:cNvPr>
+          <p:cNvSpPr>
+            <a:spLocks noGrp="1"/>
+          </p:cNvSpPr>
+          <p:nvPr>
+            <p:ph type="title"/>
+          </p:nvPr>
+        </p:nvSpPr>
+        <p:spPr/>
+        <p:txBody>
+          <a:bodyPr/>
+          <a:lstStyle/>
+          <a:p>
+            <a:r>
+              <a:rPr lang="ru-RU" sz="4400" cap="all" dirty="0"/>
+              <a:t>Сохранение и ШИФРОВАНИЕ </a:t>
+            </a:r>
+            <a:br>
+              <a:rPr lang="ru-RU" sz="4400" cap="all" dirty="0"/>
+            </a:br>
+            <a:r>
+              <a:rPr lang="ru-RU" sz="4400" cap="all" dirty="0"/>
+              <a:t>базы данных</a:t>
+            </a:r>
+            <a:endParaRPr lang="ru-RU" dirty="0"/>
+          </a:p>
+        </p:txBody>
+      </p:sp>
+      <p:pic>
+        <p:nvPicPr>
+          <p:cNvPr id="4" name="Объект 3">
+            <a:extLst>
+              <a:ext uri="{FF2B5EF4-FFF2-40B4-BE49-F238E27FC236}">
+                <a16:creationId xmlns:a16="http://schemas.microsoft.com/office/drawing/2014/main" id="{155D6297-5B02-4ED0-A782-7855CF1F36B9}"/>
+              </a:ext>
+            </a:extLst>
+          </p:cNvPr>
+          <p:cNvPicPr>
+            <a:picLocks noGrp="1" noChangeAspect="1"/>
+          </p:cNvPicPr>
+          <p:nvPr>
+            <p:ph idx="1"/>
+          </p:nvPr>
+        </p:nvPicPr>
+        <p:blipFill>
+          <a:blip r:embed="rId2">
+            <a:extLst>
+              <a:ext uri="{28A0092B-C50C-407E-A947-70E740481C1C}">
+                <a14:useLocalDpi xmlns:a14="http://schemas.microsoft.com/office/drawing/2010/main" val="0"/>
+              </a:ext>
+            </a:extLst>
+          </a:blip>
+          <a:stretch>
+            <a:fillRect/>
+          </a:stretch>
+        </p:blipFill>
+        <p:spPr>
+          <a:xfrm>
+            <a:off x="3222088" y="1873250"/>
+            <a:ext cx="5353929" cy="4825581"/>
+          </a:xfrm>
+          <a:prstGeom prst="rect">
+            <a:avLst/>
+          </a:prstGeom>
+        </p:spPr>
+      </p:pic>
+      <p:pic>
+        <p:nvPicPr>
+          <p:cNvPr id="6" name="Объект 4">
+            <a:extLst>
+              <a:ext uri="{FF2B5EF4-FFF2-40B4-BE49-F238E27FC236}">
+                <a16:creationId xmlns:a16="http://schemas.microsoft.com/office/drawing/2014/main" id="{5F05AB66-9508-40F4-83DA-6D632AA7226B}"/>
+              </a:ext>
+            </a:extLst>
+          </p:cNvPr>
+          <p:cNvPicPr>
+            <a:picLocks noChangeAspect="1"/>
+          </p:cNvPicPr>
+          <p:nvPr/>
+        </p:nvPicPr>
+        <p:blipFill>
+          <a:blip r:embed="rId3">
+            <a:extLst>
+              <a:ext uri="{28A0092B-C50C-407E-A947-70E740481C1C}">
+                <a14:useLocalDpi xmlns:a14="http://schemas.microsoft.com/office/drawing/2010/main" val="0"/>
+              </a:ext>
+            </a:extLst>
+          </a:blip>
+          <a:stretch>
+            <a:fillRect/>
+          </a:stretch>
+        </p:blipFill>
+        <p:spPr>
+          <a:xfrm>
+            <a:off x="10323120" y="253218"/>
+            <a:ext cx="1690688" cy="1690688"/>
+          </a:xfrm>
+          <a:prstGeom prst="rect">
+            <a:avLst/>
+          </a:prstGeom>
+        </p:spPr>
+      </p:pic>
+    </p:spTree>
+    <p:extLst>
+      <p:ext uri="{BB962C8B-B14F-4D97-AF65-F5344CB8AC3E}">
+        <p14:creationId xmlns:p14="http://schemas.microsoft.com/office/powerpoint/2010/main" val="1893935054"/>
+      </p:ext>
+    </p:extLst>
+  </p:cSld>
+  <p:clrMapOvr>
+    <a:masterClrMapping/>
+  </p:clrMapOvr>
+  <p:transition spd="slow">
+    <p:push dir="u"/>
+  </p:transition>
+</p:sld>
+</file>
+
+<file path=ppt/slides/slide17.xml><?xml version="1.0" encoding="utf-8"?>
 <p:sld xmlns:a="http://schemas.openxmlformats.org/drawingml/2006/main" xmlns:r="http://schemas.openxmlformats.org/officeDocument/2006/relationships" xmlns:p="http://schemas.openxmlformats.org/presentationml/2006/main">
   <p:cSld>
     <p:spTree>
@@ -5422,7 +5685,7 @@
 </p:sld>
 </file>
 
-<file path=ppt/slides/slide16.xml><?xml version="1.0" encoding="utf-8"?>
+<file path=ppt/slides/slide18.xml><?xml version="1.0" encoding="utf-8"?>
 <p:sld xmlns:a="http://schemas.openxmlformats.org/drawingml/2006/main" xmlns:r="http://schemas.openxmlformats.org/officeDocument/2006/relationships" xmlns:p="http://schemas.openxmlformats.org/presentationml/2006/main">
   <p:cSld>
     <p:spTree>
@@ -5593,7 +5856,7 @@
 </p:sld>
 </file>
 
-<file path=ppt/slides/slide17.xml><?xml version="1.0" encoding="utf-8"?>
+<file path=ppt/slides/slide19.xml><?xml version="1.0" encoding="utf-8"?>
 <p:sld xmlns:a="http://schemas.openxmlformats.org/drawingml/2006/main" xmlns:r="http://schemas.openxmlformats.org/officeDocument/2006/relationships" xmlns:p="http://schemas.openxmlformats.org/presentationml/2006/main">
   <p:cSld>
     <p:spTree>
@@ -5703,7 +5966,7 @@
           <a:p>
             <a:r>
               <a:rPr lang="ru-RU" sz="2400" dirty="0"/>
-              <a:t>	Таким образом, курсовой проект по разработке информационной системы «Учёт расчетов за проживание в общежитии» является важным инструментом для упрощения и автоматизации обслуживания общежитий. Автоматизация процесса учёта и контроля задолженностей позволит ускорить работу бухгалтеров и администраторов общежитий.</a:t>
+              <a:t>	Таким образом, курсовой проект по разработке базы данных  и информационной системы «Учёт расчетов за проживание в общежитии» является важным инструментом для упрощения и автоматизации обслуживания общежитий. Автоматизация процесса учёта и контроля задолженностей позволит ускорить работу бухгалтеров и администраторов общежитий.</a:t>
             </a:r>
           </a:p>
           <a:p>
@@ -5726,73 +5989,6 @@
   </p:clrMapOvr>
   <p:transition spd="slow">
     <p:push dir="u"/>
-  </p:transition>
-</p:sld>
-</file>
-
-<file path=ppt/slides/slide18.xml><?xml version="1.0" encoding="utf-8"?>
-<p:sld xmlns:a="http://schemas.openxmlformats.org/drawingml/2006/main" xmlns:r="http://schemas.openxmlformats.org/officeDocument/2006/relationships" xmlns:p="http://schemas.openxmlformats.org/presentationml/2006/main">
-  <p:cSld>
-    <p:spTree>
-      <p:nvGrpSpPr>
-        <p:cNvPr id="1" name=""/>
-        <p:cNvGrpSpPr/>
-        <p:nvPr/>
-      </p:nvGrpSpPr>
-      <p:grpSpPr>
-        <a:xfrm>
-          <a:off x="0" y="0"/>
-          <a:ext cx="0" cy="0"/>
-          <a:chOff x="0" y="0"/>
-          <a:chExt cx="0" cy="0"/>
-        </a:xfrm>
-      </p:grpSpPr>
-      <p:sp>
-        <p:nvSpPr>
-          <p:cNvPr id="2" name="Заголовок 1">
-            <a:extLst>
-              <a:ext uri="{FF2B5EF4-FFF2-40B4-BE49-F238E27FC236}">
-                <a16:creationId xmlns:a16="http://schemas.microsoft.com/office/drawing/2014/main" id="{CAABBEA2-6B1C-4851-8A1B-BAFAC477364B}"/>
-              </a:ext>
-            </a:extLst>
-          </p:cNvPr>
-          <p:cNvSpPr>
-            <a:spLocks noGrp="1"/>
-          </p:cNvSpPr>
-          <p:nvPr>
-            <p:ph type="title"/>
-          </p:nvPr>
-        </p:nvSpPr>
-        <p:spPr>
-          <a:xfrm>
-            <a:off x="838200" y="2766218"/>
-            <a:ext cx="10515600" cy="1325563"/>
-          </a:xfrm>
-        </p:spPr>
-        <p:txBody>
-          <a:bodyPr/>
-          <a:lstStyle/>
-          <a:p>
-            <a:pPr algn="ctr"/>
-            <a:r>
-              <a:rPr lang="ru-RU" b="1" dirty="0"/>
-              <a:t>СПАСИБО ЗА ВНИМАНИЕ</a:t>
-            </a:r>
-          </a:p>
-        </p:txBody>
-      </p:sp>
-    </p:spTree>
-    <p:extLst>
-      <p:ext uri="{BB962C8B-B14F-4D97-AF65-F5344CB8AC3E}">
-        <p14:creationId xmlns:p14="http://schemas.microsoft.com/office/powerpoint/2010/main" val="177431698"/>
-      </p:ext>
-    </p:extLst>
-  </p:cSld>
-  <p:clrMapOvr>
-    <a:masterClrMapping/>
-  </p:clrMapOvr>
-  <p:transition spd="slow">
-    <p:wipe/>
   </p:transition>
 </p:sld>
 </file>
@@ -5952,6 +6148,73 @@
   </p:clrMapOvr>
   <p:transition spd="slow">
     <p:push dir="u"/>
+  </p:transition>
+</p:sld>
+</file>
+
+<file path=ppt/slides/slide20.xml><?xml version="1.0" encoding="utf-8"?>
+<p:sld xmlns:a="http://schemas.openxmlformats.org/drawingml/2006/main" xmlns:r="http://schemas.openxmlformats.org/officeDocument/2006/relationships" xmlns:p="http://schemas.openxmlformats.org/presentationml/2006/main">
+  <p:cSld>
+    <p:spTree>
+      <p:nvGrpSpPr>
+        <p:cNvPr id="1" name=""/>
+        <p:cNvGrpSpPr/>
+        <p:nvPr/>
+      </p:nvGrpSpPr>
+      <p:grpSpPr>
+        <a:xfrm>
+          <a:off x="0" y="0"/>
+          <a:ext cx="0" cy="0"/>
+          <a:chOff x="0" y="0"/>
+          <a:chExt cx="0" cy="0"/>
+        </a:xfrm>
+      </p:grpSpPr>
+      <p:sp>
+        <p:nvSpPr>
+          <p:cNvPr id="2" name="Заголовок 1">
+            <a:extLst>
+              <a:ext uri="{FF2B5EF4-FFF2-40B4-BE49-F238E27FC236}">
+                <a16:creationId xmlns:a16="http://schemas.microsoft.com/office/drawing/2014/main" id="{CAABBEA2-6B1C-4851-8A1B-BAFAC477364B}"/>
+              </a:ext>
+            </a:extLst>
+          </p:cNvPr>
+          <p:cNvSpPr>
+            <a:spLocks noGrp="1"/>
+          </p:cNvSpPr>
+          <p:nvPr>
+            <p:ph type="title"/>
+          </p:nvPr>
+        </p:nvSpPr>
+        <p:spPr>
+          <a:xfrm>
+            <a:off x="838200" y="2766218"/>
+            <a:ext cx="10515600" cy="1325563"/>
+          </a:xfrm>
+        </p:spPr>
+        <p:txBody>
+          <a:bodyPr/>
+          <a:lstStyle/>
+          <a:p>
+            <a:pPr algn="ctr"/>
+            <a:r>
+              <a:rPr lang="ru-RU" b="1" dirty="0"/>
+              <a:t>СПАСИБО ЗА ВНИМАНИЕ</a:t>
+            </a:r>
+          </a:p>
+        </p:txBody>
+      </p:sp>
+    </p:spTree>
+    <p:extLst>
+      <p:ext uri="{BB962C8B-B14F-4D97-AF65-F5344CB8AC3E}">
+        <p14:creationId xmlns:p14="http://schemas.microsoft.com/office/powerpoint/2010/main" val="177431698"/>
+      </p:ext>
+    </p:extLst>
+  </p:cSld>
+  <p:clrMapOvr>
+    <a:masterClrMapping/>
+  </p:clrMapOvr>
+  <p:transition spd="slow">
+    <p:wipe/>
   </p:transition>
 </p:sld>
 </file>

</xml_diff>